<commit_message>
Changed the presentation and documentation
</commit_message>
<xml_diff>
--- a/documantation/TechMate.pptx
+++ b/documantation/TechMate.pptx
@@ -110,7 +110,7 @@
   </p:defaultTextStyle>
   <p:extLst>
     <p:ext uri="{EFAFB233-063F-42B5-8137-9DF3F51BA10A}">
-      <p15:sldGuideLst xmlns:p15="http://schemas.microsoft.com/office/powerpoint/2012/main"/>
+      <p15:sldGuideLst xmlns:p15="http://schemas.microsoft.com/office/powerpoint/2012/main" xmlns=""/>
     </p:ext>
   </p:extLst>
 </p:presentation>
@@ -1128,20 +1128,13 @@
           </a:pPr>
           <a:r>
             <a:rPr lang="en-US" dirty="0"/>
-            <a:t>Working on the code</a:t>
+            <a:t>Working on the </a:t>
           </a:r>
-        </a:p>
-        <a:p>
-          <a:pPr>
-            <a:lnSpc>
-              <a:spcPct val="100000"/>
-            </a:lnSpc>
-            <a:defRPr cap="all"/>
-          </a:pPr>
           <a:r>
-            <a:rPr lang="en-US" dirty="0"/>
-            <a:t>And improving the design.</a:t>
+            <a:rPr lang="en-US" dirty="0" smtClean="0"/>
+            <a:t>code</a:t>
           </a:r>
+          <a:endParaRPr lang="en-US" dirty="0"/>
         </a:p>
       </dgm:t>
     </dgm:pt>
@@ -1229,6 +1222,13 @@
         </dgm:presLayoutVars>
       </dgm:prSet>
       <dgm:spPr/>
+      <dgm:t>
+        <a:bodyPr/>
+        <a:lstStyle/>
+        <a:p>
+          <a:endParaRPr lang="en-US"/>
+        </a:p>
+      </dgm:t>
     </dgm:pt>
     <dgm:pt modelId="{DE9CE479-E4AE-4283-AEF1-10C1535B4324}" type="pres">
       <dgm:prSet presAssocID="{40FC4FFE-8987-4A26-B7F4-8A516F18ADAE}" presName="compNode" presStyleCnt="0"/>
@@ -1242,13 +1242,13 @@
       <dgm:prSet presAssocID="{40FC4FFE-8987-4A26-B7F4-8A516F18ADAE}" presName="iconRect" presStyleLbl="node1" presStyleIdx="0" presStyleCnt="3"/>
       <dgm:spPr>
         <a:blipFill>
-          <a:blip xmlns:r="http://schemas.openxmlformats.org/officeDocument/2006/relationships" r:embed="rId1">
+          <a:blip xmlns:r="http://schemas.openxmlformats.org/officeDocument/2006/relationships" r:embed="rId1" cstate="print">
             <a:extLst>
               <a:ext uri="{28A0092B-C50C-407E-A947-70E740481C1C}">
                 <a14:useLocalDpi xmlns:a14="http://schemas.microsoft.com/office/drawing/2010/main" val="0"/>
               </a:ext>
               <a:ext uri="{96DAC541-7B7A-43D3-8B79-37D633B846F1}">
-                <asvg:svgBlip xmlns:asvg="http://schemas.microsoft.com/office/drawing/2016/SVG/main" r:embed="rId2"/>
+                <asvg:svgBlip xmlns:asvg="http://schemas.microsoft.com/office/drawing/2016/SVG/main" xmlns="" r:embed="rId2"/>
               </a:ext>
             </a:extLst>
           </a:blip>
@@ -1261,6 +1261,13 @@
           <a:noFill/>
         </a:ln>
       </dgm:spPr>
+      <dgm:t>
+        <a:bodyPr/>
+        <a:lstStyle/>
+        <a:p>
+          <a:endParaRPr lang="en-US"/>
+        </a:p>
+      </dgm:t>
       <dgm:extLst>
         <a:ext uri="{E40237B7-FDA0-4F09-8148-C483321AD2D9}">
           <dgm14:cNvPr xmlns:dgm14="http://schemas.microsoft.com/office/drawing/2010/diagram" id="0" name="" descr="Bar graph with downward trend"/>
@@ -1279,6 +1286,13 @@
         </dgm:presLayoutVars>
       </dgm:prSet>
       <dgm:spPr/>
+      <dgm:t>
+        <a:bodyPr/>
+        <a:lstStyle/>
+        <a:p>
+          <a:endParaRPr lang="en-US"/>
+        </a:p>
+      </dgm:t>
     </dgm:pt>
     <dgm:pt modelId="{FD1EED9C-83D3-41AD-A09B-D3B36354168F}" type="pres">
       <dgm:prSet presAssocID="{5B62599A-5C9B-48E7-896E-EA782AC60C8B}" presName="sibTrans" presStyleCnt="0"/>
@@ -1296,13 +1310,13 @@
       <dgm:prSet presAssocID="{49225C73-1633-42F1-AB3B-7CB183E5F8B8}" presName="iconRect" presStyleLbl="node1" presStyleIdx="1" presStyleCnt="3"/>
       <dgm:spPr>
         <a:blipFill>
-          <a:blip xmlns:r="http://schemas.openxmlformats.org/officeDocument/2006/relationships" r:embed="rId3">
+          <a:blip xmlns:r="http://schemas.openxmlformats.org/officeDocument/2006/relationships" r:embed="rId3" cstate="print">
             <a:extLst>
               <a:ext uri="{28A0092B-C50C-407E-A947-70E740481C1C}">
                 <a14:useLocalDpi xmlns:a14="http://schemas.microsoft.com/office/drawing/2010/main" val="0"/>
               </a:ext>
               <a:ext uri="{96DAC541-7B7A-43D3-8B79-37D633B846F1}">
-                <asvg:svgBlip xmlns:asvg="http://schemas.microsoft.com/office/drawing/2016/SVG/main" r:embed="rId4"/>
+                <asvg:svgBlip xmlns:asvg="http://schemas.microsoft.com/office/drawing/2016/SVG/main" xmlns="" r:embed="rId4"/>
               </a:ext>
             </a:extLst>
           </a:blip>
@@ -1315,6 +1329,13 @@
           <a:noFill/>
         </a:ln>
       </dgm:spPr>
+      <dgm:t>
+        <a:bodyPr/>
+        <a:lstStyle/>
+        <a:p>
+          <a:endParaRPr lang="en-US"/>
+        </a:p>
+      </dgm:t>
       <dgm:extLst>
         <a:ext uri="{E40237B7-FDA0-4F09-8148-C483321AD2D9}">
           <dgm14:cNvPr xmlns:dgm14="http://schemas.microsoft.com/office/drawing/2010/diagram" id="0" name="" descr="Presentation with bar chart"/>
@@ -1333,6 +1354,13 @@
         </dgm:presLayoutVars>
       </dgm:prSet>
       <dgm:spPr/>
+      <dgm:t>
+        <a:bodyPr/>
+        <a:lstStyle/>
+        <a:p>
+          <a:endParaRPr lang="en-US"/>
+        </a:p>
+      </dgm:t>
     </dgm:pt>
     <dgm:pt modelId="{5A266296-0042-402F-92EF-D59AB148E92E}" type="pres">
       <dgm:prSet presAssocID="{9646853A-8964-4519-A5B1-0B7D18B2983D}" presName="sibTrans" presStyleCnt="0"/>
@@ -1350,13 +1378,13 @@
       <dgm:prSet presAssocID="{1C383F32-22E8-4F62-A3E0-BDC3D5F48992}" presName="iconRect" presStyleLbl="node1" presStyleIdx="2" presStyleCnt="3"/>
       <dgm:spPr>
         <a:blipFill>
-          <a:blip xmlns:r="http://schemas.openxmlformats.org/officeDocument/2006/relationships" r:embed="rId5">
+          <a:blip xmlns:r="http://schemas.openxmlformats.org/officeDocument/2006/relationships" r:embed="rId5" cstate="print">
             <a:extLst>
               <a:ext uri="{28A0092B-C50C-407E-A947-70E740481C1C}">
                 <a14:useLocalDpi xmlns:a14="http://schemas.microsoft.com/office/drawing/2010/main" val="0"/>
               </a:ext>
               <a:ext uri="{96DAC541-7B7A-43D3-8B79-37D633B846F1}">
-                <asvg:svgBlip xmlns:asvg="http://schemas.microsoft.com/office/drawing/2016/SVG/main" r:embed="rId6"/>
+                <asvg:svgBlip xmlns:asvg="http://schemas.microsoft.com/office/drawing/2016/SVG/main" xmlns="" r:embed="rId6"/>
               </a:ext>
             </a:extLst>
           </a:blip>
@@ -1369,6 +1397,13 @@
           <a:noFill/>
         </a:ln>
       </dgm:spPr>
+      <dgm:t>
+        <a:bodyPr/>
+        <a:lstStyle/>
+        <a:p>
+          <a:endParaRPr lang="en-US"/>
+        </a:p>
+      </dgm:t>
       <dgm:extLst>
         <a:ext uri="{E40237B7-FDA0-4F09-8148-C483321AD2D9}">
           <dgm14:cNvPr xmlns:dgm14="http://schemas.microsoft.com/office/drawing/2010/diagram" id="0" name="" descr="Stopwatch"/>
@@ -1387,15 +1422,22 @@
         </dgm:presLayoutVars>
       </dgm:prSet>
       <dgm:spPr/>
+      <dgm:t>
+        <a:bodyPr/>
+        <a:lstStyle/>
+        <a:p>
+          <a:endParaRPr lang="en-US"/>
+        </a:p>
+      </dgm:t>
     </dgm:pt>
   </dgm:ptLst>
   <dgm:cxnLst>
+    <dgm:cxn modelId="{676D3A6A-6EA7-4483-BB12-0BD4A7D7AF9D}" type="presOf" srcId="{01A66772-F185-4D58-B8BB-E9370D7A7A2B}" destId="{50B3CE7C-E10B-4E23-BD93-03664997C932}" srcOrd="0" destOrd="0" presId="urn:microsoft.com/office/officeart/2018/5/layout/IconCircleLabelList"/>
+    <dgm:cxn modelId="{7A710F69-5154-4855-ACF5-BC7C1BF85A80}" type="presOf" srcId="{49225C73-1633-42F1-AB3B-7CB183E5F8B8}" destId="{7E6FE37A-5DB0-4899-9FCB-0CE39BC185F8}" srcOrd="0" destOrd="0" presId="urn:microsoft.com/office/officeart/2018/5/layout/IconCircleLabelList"/>
     <dgm:cxn modelId="{A9154303-8225-4248-91DC-1B0156A35F07}" srcId="{01A66772-F185-4D58-B8BB-E9370D7A7A2B}" destId="{49225C73-1633-42F1-AB3B-7CB183E5F8B8}" srcOrd="1" destOrd="0" parTransId="{1A0E2090-1D4F-438A-8766-B6030CE01ADD}" sibTransId="{9646853A-8964-4519-A5B1-0B7D18B2983D}"/>
-    <dgm:cxn modelId="{7A710F69-5154-4855-ACF5-BC7C1BF85A80}" type="presOf" srcId="{49225C73-1633-42F1-AB3B-7CB183E5F8B8}" destId="{7E6FE37A-5DB0-4899-9FCB-0CE39BC185F8}" srcOrd="0" destOrd="0" presId="urn:microsoft.com/office/officeart/2018/5/layout/IconCircleLabelList"/>
+    <dgm:cxn modelId="{C4CCE57E-E871-46D6-BAD5-880252C95D22}" srcId="{01A66772-F185-4D58-B8BB-E9370D7A7A2B}" destId="{1C383F32-22E8-4F62-A3E0-BDC3D5F48992}" srcOrd="2" destOrd="0" parTransId="{A7920A2F-3244-4159-AF04-6A1D38B7B317}" sibTransId="{8500F72A-2C6D-4FDF-9C1D-CA691380EB0B}"/>
+    <dgm:cxn modelId="{1496FC70-DB8B-48D4-98DE-DD2856E389EE}" type="presOf" srcId="{1C383F32-22E8-4F62-A3E0-BDC3D5F48992}" destId="{1AEDC777-00B3-41D7-9AE1-23D741E941C3}" srcOrd="0" destOrd="0" presId="urn:microsoft.com/office/officeart/2018/5/layout/IconCircleLabelList"/>
     <dgm:cxn modelId="{C7AD8469-3C68-4AF9-AB82-79B0043AA120}" srcId="{01A66772-F185-4D58-B8BB-E9370D7A7A2B}" destId="{40FC4FFE-8987-4A26-B7F4-8A516F18ADAE}" srcOrd="0" destOrd="0" parTransId="{CAD7EF86-FB23-41F6-BF42-040B36DEFDB1}" sibTransId="{5B62599A-5C9B-48E7-896E-EA782AC60C8B}"/>
-    <dgm:cxn modelId="{676D3A6A-6EA7-4483-BB12-0BD4A7D7AF9D}" type="presOf" srcId="{01A66772-F185-4D58-B8BB-E9370D7A7A2B}" destId="{50B3CE7C-E10B-4E23-BD93-03664997C932}" srcOrd="0" destOrd="0" presId="urn:microsoft.com/office/officeart/2018/5/layout/IconCircleLabelList"/>
-    <dgm:cxn modelId="{1496FC70-DB8B-48D4-98DE-DD2856E389EE}" type="presOf" srcId="{1C383F32-22E8-4F62-A3E0-BDC3D5F48992}" destId="{1AEDC777-00B3-41D7-9AE1-23D741E941C3}" srcOrd="0" destOrd="0" presId="urn:microsoft.com/office/officeart/2018/5/layout/IconCircleLabelList"/>
-    <dgm:cxn modelId="{C4CCE57E-E871-46D6-BAD5-880252C95D22}" srcId="{01A66772-F185-4D58-B8BB-E9370D7A7A2B}" destId="{1C383F32-22E8-4F62-A3E0-BDC3D5F48992}" srcOrd="2" destOrd="0" parTransId="{A7920A2F-3244-4159-AF04-6A1D38B7B317}" sibTransId="{8500F72A-2C6D-4FDF-9C1D-CA691380EB0B}"/>
     <dgm:cxn modelId="{355227E3-55E0-4343-BC8D-FC0EB1694F48}" type="presOf" srcId="{40FC4FFE-8987-4A26-B7F4-8A516F18ADAE}" destId="{127117FB-F8A7-4A20-A8A7-EC686DDC76D0}" srcOrd="0" destOrd="0" presId="urn:microsoft.com/office/officeart/2018/5/layout/IconCircleLabelList"/>
     <dgm:cxn modelId="{555498CB-3ED1-404E-A25F-EB243EFC5FB1}" type="presParOf" srcId="{50B3CE7C-E10B-4E23-BD93-03664997C932}" destId="{DE9CE479-E4AE-4283-AEF1-10C1535B4324}" srcOrd="0" destOrd="0" presId="urn:microsoft.com/office/officeart/2018/5/layout/IconCircleLabelList"/>
     <dgm:cxn modelId="{11F12D49-CD08-4D50-BD13-3ECBC3A476A4}" type="presParOf" srcId="{DE9CE479-E4AE-4283-AEF1-10C1535B4324}" destId="{B59FCF02-CAD2-4D6F-9542-AD86711168CA}" srcOrd="0" destOrd="0" presId="urn:microsoft.com/office/officeart/2018/5/layout/IconCircleLabelList"/>
@@ -1486,13 +1528,13 @@
           <a:avLst/>
         </a:prstGeom>
         <a:blipFill>
-          <a:blip xmlns:r="http://schemas.openxmlformats.org/officeDocument/2006/relationships" r:embed="rId1">
+          <a:blip xmlns:r="http://schemas.openxmlformats.org/officeDocument/2006/relationships" r:embed="rId1" cstate="print">
             <a:extLst>
               <a:ext uri="{28A0092B-C50C-407E-A947-70E740481C1C}">
                 <a14:useLocalDpi xmlns:a14="http://schemas.microsoft.com/office/drawing/2010/main" val="0"/>
               </a:ext>
               <a:ext uri="{96DAC541-7B7A-43D3-8B79-37D633B846F1}">
-                <asvg:svgBlip xmlns:asvg="http://schemas.microsoft.com/office/drawing/2016/SVG/main" r:embed="rId2"/>
+                <asvg:svgBlip xmlns:asvg="http://schemas.microsoft.com/office/drawing/2016/SVG/main" xmlns="" r:embed="rId2"/>
               </a:ext>
             </a:extLst>
           </a:blip>
@@ -1559,7 +1601,7 @@
         </a:bodyPr>
         <a:lstStyle/>
         <a:p>
-          <a:pPr marL="0" lvl="0" indent="0" algn="ctr" defTabSz="666750">
+          <a:pPr lvl="0" algn="ctr" defTabSz="666750">
             <a:lnSpc>
               <a:spcPct val="100000"/>
             </a:lnSpc>
@@ -1569,7 +1611,6 @@
             <a:spcAft>
               <a:spcPct val="35000"/>
             </a:spcAft>
-            <a:buNone/>
             <a:defRPr cap="all"/>
           </a:pPr>
           <a:r>
@@ -1578,7 +1619,7 @@
           </a:r>
         </a:p>
         <a:p>
-          <a:pPr marL="0" lvl="0" indent="0" algn="ctr" defTabSz="666750">
+          <a:pPr lvl="0" algn="ctr" defTabSz="666750">
             <a:lnSpc>
               <a:spcPct val="100000"/>
             </a:lnSpc>
@@ -1588,7 +1629,6 @@
             <a:spcAft>
               <a:spcPct val="35000"/>
             </a:spcAft>
-            <a:buNone/>
             <a:defRPr cap="all"/>
           </a:pPr>
           <a:r>
@@ -1655,13 +1695,13 @@
           <a:avLst/>
         </a:prstGeom>
         <a:blipFill>
-          <a:blip xmlns:r="http://schemas.openxmlformats.org/officeDocument/2006/relationships" r:embed="rId3">
+          <a:blip xmlns:r="http://schemas.openxmlformats.org/officeDocument/2006/relationships" r:embed="rId3" cstate="print">
             <a:extLst>
               <a:ext uri="{28A0092B-C50C-407E-A947-70E740481C1C}">
                 <a14:useLocalDpi xmlns:a14="http://schemas.microsoft.com/office/drawing/2010/main" val="0"/>
               </a:ext>
               <a:ext uri="{96DAC541-7B7A-43D3-8B79-37D633B846F1}">
-                <asvg:svgBlip xmlns:asvg="http://schemas.microsoft.com/office/drawing/2016/SVG/main" r:embed="rId4"/>
+                <asvg:svgBlip xmlns:asvg="http://schemas.microsoft.com/office/drawing/2016/SVG/main" xmlns="" r:embed="rId4"/>
               </a:ext>
             </a:extLst>
           </a:blip>
@@ -1728,7 +1768,7 @@
         </a:bodyPr>
         <a:lstStyle/>
         <a:p>
-          <a:pPr marL="0" lvl="0" indent="0" algn="ctr" defTabSz="666750">
+          <a:pPr lvl="0" algn="ctr" defTabSz="666750">
             <a:lnSpc>
               <a:spcPct val="100000"/>
             </a:lnSpc>
@@ -1738,32 +1778,17 @@
             <a:spcAft>
               <a:spcPct val="35000"/>
             </a:spcAft>
-            <a:buNone/>
             <a:defRPr cap="all"/>
           </a:pPr>
           <a:r>
             <a:rPr lang="en-US" sz="1500" kern="1200" dirty="0"/>
-            <a:t>Working on the code</a:t>
+            <a:t>Working on the </a:t>
           </a:r>
-        </a:p>
-        <a:p>
-          <a:pPr marL="0" lvl="0" indent="0" algn="ctr" defTabSz="666750">
-            <a:lnSpc>
-              <a:spcPct val="100000"/>
-            </a:lnSpc>
-            <a:spcBef>
-              <a:spcPct val="0"/>
-            </a:spcBef>
-            <a:spcAft>
-              <a:spcPct val="35000"/>
-            </a:spcAft>
-            <a:buNone/>
-            <a:defRPr cap="all"/>
-          </a:pPr>
           <a:r>
-            <a:rPr lang="en-US" sz="1500" kern="1200" dirty="0"/>
-            <a:t>And improving the design.</a:t>
+            <a:rPr lang="en-US" sz="1500" kern="1200" dirty="0" smtClean="0"/>
+            <a:t>code</a:t>
           </a:r>
+          <a:endParaRPr lang="en-US" sz="1500" kern="1200" dirty="0"/>
         </a:p>
       </dsp:txBody>
       <dsp:txXfrm>
@@ -1824,13 +1849,13 @@
           <a:avLst/>
         </a:prstGeom>
         <a:blipFill>
-          <a:blip xmlns:r="http://schemas.openxmlformats.org/officeDocument/2006/relationships" r:embed="rId5">
+          <a:blip xmlns:r="http://schemas.openxmlformats.org/officeDocument/2006/relationships" r:embed="rId5" cstate="print">
             <a:extLst>
               <a:ext uri="{28A0092B-C50C-407E-A947-70E740481C1C}">
                 <a14:useLocalDpi xmlns:a14="http://schemas.microsoft.com/office/drawing/2010/main" val="0"/>
               </a:ext>
               <a:ext uri="{96DAC541-7B7A-43D3-8B79-37D633B846F1}">
-                <asvg:svgBlip xmlns:asvg="http://schemas.microsoft.com/office/drawing/2016/SVG/main" r:embed="rId6"/>
+                <asvg:svgBlip xmlns:asvg="http://schemas.microsoft.com/office/drawing/2016/SVG/main" xmlns="" r:embed="rId6"/>
               </a:ext>
             </a:extLst>
           </a:blip>
@@ -1897,7 +1922,7 @@
         </a:bodyPr>
         <a:lstStyle/>
         <a:p>
-          <a:pPr marL="0" lvl="0" indent="0" algn="ctr" defTabSz="666750">
+          <a:pPr lvl="0" algn="ctr" defTabSz="666750">
             <a:lnSpc>
               <a:spcPct val="100000"/>
             </a:lnSpc>
@@ -1907,7 +1932,6 @@
             <a:spcAft>
               <a:spcPct val="35000"/>
             </a:spcAft>
-            <a:buNone/>
             <a:defRPr cap="all"/>
           </a:pPr>
           <a:r>
@@ -1916,7 +1940,7 @@
           </a:r>
         </a:p>
         <a:p>
-          <a:pPr marL="0" lvl="0" indent="0" algn="ctr" defTabSz="666750">
+          <a:pPr lvl="0" algn="ctr" defTabSz="666750">
             <a:lnSpc>
               <a:spcPct val="100000"/>
             </a:lnSpc>
@@ -1926,7 +1950,6 @@
             <a:spcAft>
               <a:spcPct val="35000"/>
             </a:spcAft>
-            <a:buNone/>
             <a:defRPr cap="all"/>
           </a:pPr>
           <a:r>
@@ -2146,7 +2169,7 @@
   </dgm:layoutNode>
   <dgm:extLst>
     <a:ext uri="{68A01E43-0DF5-4B5B-8FA6-DAF915123BFB}">
-      <dgm1612:lstStyle xmlns:dgm1612="http://schemas.microsoft.com/office/drawing/2016/12/diagram">
+      <dgm1612:lstStyle xmlns:dgm1612="http://schemas.microsoft.com/office/drawing/2016/12/diagram" xmlns="">
         <a:lvl1pPr>
           <a:lnSpc>
             <a:spcPct val="100000"/>
@@ -3215,7 +3238,7 @@
           <p:cNvPr id="5" name="Rectangle 4">
             <a:extLst>
               <a:ext uri="{FF2B5EF4-FFF2-40B4-BE49-F238E27FC236}">
-                <a16:creationId xmlns:a16="http://schemas.microsoft.com/office/drawing/2014/main" id="{904DB13E-F722-4ED6-BB00-556651E95281}"/>
+                <a16:creationId xmlns:a16="http://schemas.microsoft.com/office/drawing/2014/main" xmlns="" id="{904DB13E-F722-4ED6-BB00-556651E95281}"/>
               </a:ext>
             </a:extLst>
           </p:cNvPr>
@@ -3364,7 +3387,7 @@
           <p:cNvPr id="7" name="Group 6">
             <a:extLst>
               <a:ext uri="{FF2B5EF4-FFF2-40B4-BE49-F238E27FC236}">
-                <a16:creationId xmlns:a16="http://schemas.microsoft.com/office/drawing/2014/main" id="{E26428D7-C6F3-473D-A360-A3F5C3E8728C}"/>
+                <a16:creationId xmlns:a16="http://schemas.microsoft.com/office/drawing/2014/main" xmlns="" id="{E26428D7-C6F3-473D-A360-A3F5C3E8728C}"/>
               </a:ext>
             </a:extLst>
           </p:cNvPr>
@@ -3662,7 +3685,7 @@
           <a:p>
             <a:fld id="{EA0C0817-A112-4847-8014-A94B7D2A4EA3}" type="datetime1">
               <a:rPr lang="en-US" smtClean="0"/>
-              <a:t>1/9/2025</a:t>
+              <a:t>1/10/2025</a:t>
             </a:fld>
             <a:endParaRPr lang="en-US" dirty="0"/>
           </a:p>
@@ -3864,7 +3887,7 @@
           <a:p>
             <a:fld id="{134F40B7-36AB-4376-BE14-EF7004D79BB9}" type="datetime1">
               <a:rPr lang="en-US" smtClean="0"/>
-              <a:t>1/9/2025</a:t>
+              <a:t>1/10/2025</a:t>
             </a:fld>
             <a:endParaRPr lang="en-US"/>
           </a:p>
@@ -4044,7 +4067,7 @@
           <a:p>
             <a:fld id="{FF87CAB8-DCAE-46A5-AADA-B3FAD11A54E0}" type="datetime1">
               <a:rPr lang="en-US" smtClean="0"/>
-              <a:t>1/9/2025</a:t>
+              <a:t>1/10/2025</a:t>
             </a:fld>
             <a:endParaRPr lang="en-US"/>
           </a:p>
@@ -4214,7 +4237,7 @@
           <a:p>
             <a:fld id="{7332B432-ACDA-4023-A761-2BAB76577B62}" type="datetime1">
               <a:rPr lang="en-US" smtClean="0"/>
-              <a:t>1/9/2025</a:t>
+              <a:t>1/10/2025</a:t>
             </a:fld>
             <a:endParaRPr lang="en-US"/>
           </a:p>
@@ -4297,7 +4320,7 @@
           <p:cNvPr id="15" name="Rectangle 14">
             <a:extLst>
               <a:ext uri="{FF2B5EF4-FFF2-40B4-BE49-F238E27FC236}">
-                <a16:creationId xmlns:a16="http://schemas.microsoft.com/office/drawing/2014/main" id="{0A4A1889-E37C-4EC3-9E41-9DAD221CF389}"/>
+                <a16:creationId xmlns:a16="http://schemas.microsoft.com/office/drawing/2014/main" xmlns="" id="{0A4A1889-E37C-4EC3-9E41-9DAD221CF389}"/>
               </a:ext>
             </a:extLst>
           </p:cNvPr>
@@ -4494,7 +4517,7 @@
           <p:cNvPr id="16" name="Group 15">
             <a:extLst>
               <a:ext uri="{FF2B5EF4-FFF2-40B4-BE49-F238E27FC236}">
-                <a16:creationId xmlns:a16="http://schemas.microsoft.com/office/drawing/2014/main" id="{1683EB04-C23E-490C-A1A6-030CF79D23C8}"/>
+                <a16:creationId xmlns:a16="http://schemas.microsoft.com/office/drawing/2014/main" xmlns="" id="{1683EB04-C23E-490C-A1A6-030CF79D23C8}"/>
               </a:ext>
             </a:extLst>
           </p:cNvPr>
@@ -4514,7 +4537,7 @@
             <p:cNvPr id="17" name="Straight Connector 16">
               <a:extLst>
                 <a:ext uri="{FF2B5EF4-FFF2-40B4-BE49-F238E27FC236}">
-                  <a16:creationId xmlns:a16="http://schemas.microsoft.com/office/drawing/2014/main" id="{F8A84C03-E1CA-4A4E-81D6-9BB0C335B7A0}"/>
+                  <a16:creationId xmlns:a16="http://schemas.microsoft.com/office/drawing/2014/main" xmlns="" id="{F8A84C03-E1CA-4A4E-81D6-9BB0C335B7A0}"/>
                 </a:ext>
               </a:extLst>
             </p:cNvPr>
@@ -4562,7 +4585,7 @@
             <p:cNvPr id="18" name="Straight Connector 17">
               <a:extLst>
                 <a:ext uri="{FF2B5EF4-FFF2-40B4-BE49-F238E27FC236}">
-                  <a16:creationId xmlns:a16="http://schemas.microsoft.com/office/drawing/2014/main" id="{4A26FB5A-D5D1-4DAB-AC43-7F51A7F2D197}"/>
+                  <a16:creationId xmlns:a16="http://schemas.microsoft.com/office/drawing/2014/main" xmlns="" id="{4A26FB5A-D5D1-4DAB-AC43-7F51A7F2D197}"/>
                 </a:ext>
               </a:extLst>
             </p:cNvPr>
@@ -4610,7 +4633,7 @@
             <p:cNvPr id="19" name="Straight Connector 18">
               <a:extLst>
                 <a:ext uri="{FF2B5EF4-FFF2-40B4-BE49-F238E27FC236}">
-                  <a16:creationId xmlns:a16="http://schemas.microsoft.com/office/drawing/2014/main" id="{49303F14-E560-4C02-94F4-B4695FE26813}"/>
+                  <a16:creationId xmlns:a16="http://schemas.microsoft.com/office/drawing/2014/main" xmlns="" id="{49303F14-E560-4C02-94F4-B4695FE26813}"/>
                 </a:ext>
               </a:extLst>
             </p:cNvPr>
@@ -4813,7 +4836,7 @@
           <a:p>
             <a:fld id="{D9C646AA-F36E-4540-911D-FFFC0A0EF24A}" type="datetime1">
               <a:rPr lang="en-US" smtClean="0"/>
-              <a:t>1/9/2025</a:t>
+              <a:t>1/10/2025</a:t>
             </a:fld>
             <a:endParaRPr lang="en-US" dirty="0"/>
           </a:p>
@@ -5133,7 +5156,7 @@
           <a:p>
             <a:fld id="{69186D26-FA5F-4637-B602-B7C2DC34CFD4}" type="datetime1">
               <a:rPr lang="en-US" smtClean="0"/>
-              <a:t>1/9/2025</a:t>
+              <a:t>1/10/2025</a:t>
             </a:fld>
             <a:endParaRPr lang="en-US"/>
           </a:p>
@@ -5570,7 +5593,7 @@
           <a:p>
             <a:fld id="{8A7F15D8-96D1-4781-BC50-CA8A088B2FE4}" type="datetime1">
               <a:rPr lang="en-US" smtClean="0"/>
-              <a:t>1/9/2025</a:t>
+              <a:t>1/10/2025</a:t>
             </a:fld>
             <a:endParaRPr lang="en-US"/>
           </a:p>
@@ -5688,7 +5711,7 @@
           <a:p>
             <a:fld id="{F9A96C99-B8F8-4528-BD05-0E16E943DC09}" type="datetime1">
               <a:rPr lang="en-US" smtClean="0"/>
-              <a:t>1/9/2025</a:t>
+              <a:t>1/10/2025</a:t>
             </a:fld>
             <a:endParaRPr lang="en-US"/>
           </a:p>
@@ -5783,7 +5806,7 @@
           <a:p>
             <a:fld id="{03636942-C211-4B28-8DBD-C953E00AF71B}" type="datetime1">
               <a:rPr lang="en-US" smtClean="0"/>
-              <a:t>1/9/2025</a:t>
+              <a:t>1/10/2025</a:t>
             </a:fld>
             <a:endParaRPr lang="en-US"/>
           </a:p>
@@ -5866,7 +5889,7 @@
           <p:cNvPr id="10" name="Rectangle 9">
             <a:extLst>
               <a:ext uri="{FF2B5EF4-FFF2-40B4-BE49-F238E27FC236}">
-                <a16:creationId xmlns:a16="http://schemas.microsoft.com/office/drawing/2014/main" id="{D5E1BBF9-8BEF-4353-BA68-30AAF9EBD8D8}"/>
+                <a16:creationId xmlns:a16="http://schemas.microsoft.com/office/drawing/2014/main" xmlns="" id="{D5E1BBF9-8BEF-4353-BA68-30AAF9EBD8D8}"/>
               </a:ext>
             </a:extLst>
           </p:cNvPr>
@@ -5913,7 +5936,7 @@
           <p:cNvPr id="13" name="Rectangle 12">
             <a:extLst>
               <a:ext uri="{FF2B5EF4-FFF2-40B4-BE49-F238E27FC236}">
-                <a16:creationId xmlns:a16="http://schemas.microsoft.com/office/drawing/2014/main" id="{5B941C21-2A5D-4912-AB06-1BB0C0EB6AE1}"/>
+                <a16:creationId xmlns:a16="http://schemas.microsoft.com/office/drawing/2014/main" xmlns="" id="{5B941C21-2A5D-4912-AB06-1BB0C0EB6AE1}"/>
               </a:ext>
             </a:extLst>
           </p:cNvPr>
@@ -6200,7 +6223,7 @@
           <a:p>
             <a:fld id="{7E8D12A6-918A-48BD-8CB9-CA713993B0EA}" type="datetime1">
               <a:rPr lang="en-US" smtClean="0"/>
-              <a:t>1/9/2025</a:t>
+              <a:t>1/10/2025</a:t>
             </a:fld>
             <a:endParaRPr lang="en-US"/>
           </a:p>
@@ -6308,7 +6331,7 @@
           <p:cNvPr id="11" name="Rectangle 10">
             <a:extLst>
               <a:ext uri="{FF2B5EF4-FFF2-40B4-BE49-F238E27FC236}">
-                <a16:creationId xmlns:a16="http://schemas.microsoft.com/office/drawing/2014/main" id="{E687CA98-D9C7-497F-A1DA-7D22F8753BCE}"/>
+                <a16:creationId xmlns:a16="http://schemas.microsoft.com/office/drawing/2014/main" xmlns="" id="{E687CA98-D9C7-497F-A1DA-7D22F8753BCE}"/>
               </a:ext>
             </a:extLst>
           </p:cNvPr>
@@ -6462,7 +6485,7 @@
             <a:fld id="{E778CE86-875F-4587-BCF6-FA054AFC0D53}" type="datetime1">
               <a:rPr lang="en-US" smtClean="0"/>
               <a:pPr/>
-              <a:t>1/9/2025</a:t>
+              <a:t>1/10/2025</a:t>
             </a:fld>
             <a:endParaRPr lang="en-US" dirty="0"/>
           </a:p>
@@ -6544,7 +6567,7 @@
           <p:cNvPr id="12" name="Rectangle 11">
             <a:extLst>
               <a:ext uri="{FF2B5EF4-FFF2-40B4-BE49-F238E27FC236}">
-                <a16:creationId xmlns:a16="http://schemas.microsoft.com/office/drawing/2014/main" id="{F8B3D8CC-BB13-41A5-8F34-B8E84A4F9534}"/>
+                <a16:creationId xmlns:a16="http://schemas.microsoft.com/office/drawing/2014/main" xmlns="" id="{F8B3D8CC-BB13-41A5-8F34-B8E84A4F9534}"/>
               </a:ext>
             </a:extLst>
           </p:cNvPr>
@@ -6746,7 +6769,7 @@
           <p:cNvPr id="9" name="Rectangle 8">
             <a:extLst>
               <a:ext uri="{FF2B5EF4-FFF2-40B4-BE49-F238E27FC236}">
-                <a16:creationId xmlns:a16="http://schemas.microsoft.com/office/drawing/2014/main" id="{1E94681D-2A4C-4A8D-B9B5-31D440D0328D}"/>
+                <a16:creationId xmlns:a16="http://schemas.microsoft.com/office/drawing/2014/main" xmlns="" id="{1E94681D-2A4C-4A8D-B9B5-31D440D0328D}"/>
               </a:ext>
             </a:extLst>
           </p:cNvPr>
@@ -6978,7 +7001,7 @@
           <a:p>
             <a:fld id="{F6FA2B21-3FCD-4721-B95C-427943F61125}" type="datetime1">
               <a:rPr lang="en-US" smtClean="0"/>
-              <a:t>1/9/2025</a:t>
+              <a:t>1/10/2025</a:t>
             </a:fld>
             <a:endParaRPr lang="en-US"/>
           </a:p>
@@ -7460,7 +7483,7 @@
           <p:cNvPr id="6" name="Picture 5" descr="A close up of a logo&#10;&#10;Description automatically generated">
             <a:extLst>
               <a:ext uri="{FF2B5EF4-FFF2-40B4-BE49-F238E27FC236}">
-                <a16:creationId xmlns:a16="http://schemas.microsoft.com/office/drawing/2014/main" id="{8045422F-7258-40AC-BD2E-2469AA448922}"/>
+                <a16:creationId xmlns:a16="http://schemas.microsoft.com/office/drawing/2014/main" xmlns="" id="{8045422F-7258-40AC-BD2E-2469AA448922}"/>
               </a:ext>
             </a:extLst>
           </p:cNvPr>
@@ -7482,7 +7505,7 @@
         </p:blipFill>
         <p:spPr>
           <a:xfrm>
-            <a:off x="20" y="10"/>
+            <a:off x="20" y="8636"/>
             <a:ext cx="12191979" cy="6857990"/>
           </a:xfrm>
           <a:prstGeom prst="rect">
@@ -7495,10 +7518,10 @@
           <p:cNvPr id="82" name="Rectangle 81">
             <a:extLst>
               <a:ext uri="{FF2B5EF4-FFF2-40B4-BE49-F238E27FC236}">
-                <a16:creationId xmlns:a16="http://schemas.microsoft.com/office/drawing/2014/main" id="{2644B391-9BFE-445C-A9EC-F544BB85FBC7}"/>
+                <a16:creationId xmlns:a16="http://schemas.microsoft.com/office/drawing/2014/main" xmlns="" id="{2644B391-9BFE-445C-A9EC-F544BB85FBC7}"/>
               </a:ext>
               <a:ext uri="{C183D7F6-B498-43B3-948B-1728B52AA6E4}">
-                <adec:decorative xmlns:adec="http://schemas.microsoft.com/office/drawing/2017/decorative" val="1"/>
+                <adec:decorative xmlns:adec="http://schemas.microsoft.com/office/drawing/2017/decorative" xmlns="" val="1"/>
               </a:ext>
             </a:extLst>
           </p:cNvPr>
@@ -7508,7 +7531,7 @@
           <p:nvPr>
             <p:extLst>
               <p:ext uri="{386F3935-93C4-4BCD-93E2-E3B085C9AB24}">
-                <p16:designElem xmlns:p16="http://schemas.microsoft.com/office/powerpoint/2015/main" val="1"/>
+                <p16:designElem xmlns:p16="http://schemas.microsoft.com/office/powerpoint/2015/main" xmlns="" val="1"/>
               </p:ext>
             </p:extLst>
           </p:nvPr>
@@ -7540,10 +7563,10 @@
           <p:cNvPr id="84" name="Rectangle 83">
             <a:extLst>
               <a:ext uri="{FF2B5EF4-FFF2-40B4-BE49-F238E27FC236}">
-                <a16:creationId xmlns:a16="http://schemas.microsoft.com/office/drawing/2014/main" id="{80F26E69-87D9-4655-AE7B-280A87AA3CAD}"/>
+                <a16:creationId xmlns:a16="http://schemas.microsoft.com/office/drawing/2014/main" xmlns="" id="{80F26E69-87D9-4655-AE7B-280A87AA3CAD}"/>
               </a:ext>
               <a:ext uri="{C183D7F6-B498-43B3-948B-1728B52AA6E4}">
-                <adec:decorative xmlns:adec="http://schemas.microsoft.com/office/drawing/2017/decorative" val="1"/>
+                <adec:decorative xmlns:adec="http://schemas.microsoft.com/office/drawing/2017/decorative" xmlns="" val="1"/>
               </a:ext>
             </a:extLst>
           </p:cNvPr>
@@ -7553,7 +7576,7 @@
           <p:nvPr>
             <p:extLst>
               <p:ext uri="{386F3935-93C4-4BCD-93E2-E3B085C9AB24}">
-                <p16:designElem xmlns:p16="http://schemas.microsoft.com/office/powerpoint/2015/main" val="1"/>
+                <p16:designElem xmlns:p16="http://schemas.microsoft.com/office/powerpoint/2015/main" xmlns="" val="1"/>
               </p:ext>
             </p:extLst>
           </p:nvPr>
@@ -7584,7 +7607,7 @@
           <p:cNvPr id="2" name="Title 1">
             <a:extLst>
               <a:ext uri="{FF2B5EF4-FFF2-40B4-BE49-F238E27FC236}">
-                <a16:creationId xmlns:a16="http://schemas.microsoft.com/office/drawing/2014/main" id="{18C3B467-088C-4F3D-A9A7-105C4E1E20CD}"/>
+                <a16:creationId xmlns:a16="http://schemas.microsoft.com/office/drawing/2014/main" xmlns="" id="{18C3B467-088C-4F3D-A9A7-105C4E1E20CD}"/>
               </a:ext>
             </a:extLst>
           </p:cNvPr>
@@ -7608,10 +7631,12 @@
           <a:lstStyle/>
           <a:p>
             <a:r>
-              <a:rPr lang="en-US" sz="4800" dirty="0">
-                <a:hlinkClick r:id="rId3"/>
+              <a:rPr lang="en-GB" sz="4800" dirty="0" smtClean="0">
+                <a:solidFill>
+                  <a:srgbClr val="00B0F0"/>
+                </a:solidFill>
               </a:rPr>
-              <a:t>fin u(P)a-(p)-p</a:t>
+              <a:t>Tech mate</a:t>
             </a:r>
             <a:endParaRPr lang="en-US" sz="4800" dirty="0">
               <a:solidFill>
@@ -7664,7 +7689,7 @@
           <p:cNvPr id="2" name="Title 1">
             <a:extLst>
               <a:ext uri="{FF2B5EF4-FFF2-40B4-BE49-F238E27FC236}">
-                <a16:creationId xmlns:a16="http://schemas.microsoft.com/office/drawing/2014/main" id="{7A4919D0-F177-4BBA-9A0B-DBA69E2ED764}"/>
+                <a16:creationId xmlns:a16="http://schemas.microsoft.com/office/drawing/2014/main" xmlns="" id="{7A4919D0-F177-4BBA-9A0B-DBA69E2ED764}"/>
               </a:ext>
             </a:extLst>
           </p:cNvPr>
@@ -7697,10 +7722,10 @@
       </p:sp>
       <p:pic>
         <p:nvPicPr>
-          <p:cNvPr id="6" name="Picture 5">
+          <p:cNvPr id="12" name="Picture 11">
             <a:extLst>
               <a:ext uri="{FF2B5EF4-FFF2-40B4-BE49-F238E27FC236}">
-                <a16:creationId xmlns:a16="http://schemas.microsoft.com/office/drawing/2014/main" id="{EA774FB8-646E-4ED6-94B8-5E8208080731}"/>
+                <a16:creationId xmlns:a16="http://schemas.microsoft.com/office/drawing/2014/main" xmlns="" id="{ECB3A3FE-FCB2-4C52-B9DE-C2CE003BF5D8}"/>
               </a:ext>
             </a:extLst>
           </p:cNvPr>
@@ -7711,204 +7736,6 @@
         </p:nvPicPr>
         <p:blipFill>
           <a:blip r:embed="rId2">
-            <a:extLst>
-              <a:ext uri="{28A0092B-C50C-407E-A947-70E740481C1C}">
-                <a14:useLocalDpi xmlns:a14="http://schemas.microsoft.com/office/drawing/2010/main" val="0"/>
-              </a:ext>
-            </a:extLst>
-          </a:blip>
-          <a:stretch>
-            <a:fillRect/>
-          </a:stretch>
-        </p:blipFill>
-        <p:spPr>
-          <a:xfrm>
-            <a:off x="1055705" y="2591512"/>
-            <a:ext cx="1313564" cy="1371600"/>
-          </a:xfrm>
-          <a:prstGeom prst="rect">
-            <a:avLst/>
-          </a:prstGeom>
-          <a:solidFill>
-            <a:srgbClr val="FFFFFF">
-              <a:shade val="85000"/>
-            </a:srgbClr>
-          </a:solidFill>
-          <a:ln w="88900" cap="sq">
-            <a:solidFill>
-              <a:srgbClr val="FFFFFF"/>
-            </a:solidFill>
-            <a:miter lim="800000"/>
-          </a:ln>
-          <a:effectLst>
-            <a:outerShdw blurRad="55000" dist="18000" dir="5400000" algn="tl" rotWithShape="0">
-              <a:srgbClr val="000000">
-                <a:alpha val="40000"/>
-              </a:srgbClr>
-            </a:outerShdw>
-          </a:effectLst>
-          <a:scene3d>
-            <a:camera prst="orthographicFront"/>
-            <a:lightRig rig="twoPt" dir="t">
-              <a:rot lat="0" lon="0" rev="7200000"/>
-            </a:lightRig>
-          </a:scene3d>
-          <a:sp3d>
-            <a:bevelT w="25400" h="19050"/>
-            <a:contourClr>
-              <a:srgbClr val="FFFFFF"/>
-            </a:contourClr>
-          </a:sp3d>
-        </p:spPr>
-      </p:pic>
-      <p:pic>
-        <p:nvPicPr>
-          <p:cNvPr id="8" name="Picture 7">
-            <a:extLst>
-              <a:ext uri="{FF2B5EF4-FFF2-40B4-BE49-F238E27FC236}">
-                <a16:creationId xmlns:a16="http://schemas.microsoft.com/office/drawing/2014/main" id="{2D66D5A2-0959-4A4D-B8E0-7852B860D680}"/>
-              </a:ext>
-            </a:extLst>
-          </p:cNvPr>
-          <p:cNvPicPr>
-            <a:picLocks noChangeAspect="1"/>
-          </p:cNvPicPr>
-          <p:nvPr/>
-        </p:nvPicPr>
-        <p:blipFill>
-          <a:blip r:embed="rId3">
-            <a:extLst>
-              <a:ext uri="{28A0092B-C50C-407E-A947-70E740481C1C}">
-                <a14:useLocalDpi xmlns:a14="http://schemas.microsoft.com/office/drawing/2010/main" val="0"/>
-              </a:ext>
-            </a:extLst>
-          </a:blip>
-          <a:stretch>
-            <a:fillRect/>
-          </a:stretch>
-        </p:blipFill>
-        <p:spPr>
-          <a:xfrm>
-            <a:off x="3758724" y="2591512"/>
-            <a:ext cx="1213503" cy="1371599"/>
-          </a:xfrm>
-          <a:prstGeom prst="rect">
-            <a:avLst/>
-          </a:prstGeom>
-          <a:solidFill>
-            <a:srgbClr val="FFFFFF">
-              <a:shade val="85000"/>
-            </a:srgbClr>
-          </a:solidFill>
-          <a:ln w="88900" cap="sq">
-            <a:solidFill>
-              <a:srgbClr val="FFFFFF"/>
-            </a:solidFill>
-            <a:miter lim="800000"/>
-          </a:ln>
-          <a:effectLst>
-            <a:outerShdw blurRad="55000" dist="18000" dir="5400000" algn="tl" rotWithShape="0">
-              <a:srgbClr val="000000">
-                <a:alpha val="40000"/>
-              </a:srgbClr>
-            </a:outerShdw>
-          </a:effectLst>
-          <a:scene3d>
-            <a:camera prst="orthographicFront"/>
-            <a:lightRig rig="twoPt" dir="t">
-              <a:rot lat="0" lon="0" rev="7200000"/>
-            </a:lightRig>
-          </a:scene3d>
-          <a:sp3d>
-            <a:bevelT w="25400" h="19050"/>
-            <a:contourClr>
-              <a:srgbClr val="FFFFFF"/>
-            </a:contourClr>
-          </a:sp3d>
-        </p:spPr>
-      </p:pic>
-      <p:pic>
-        <p:nvPicPr>
-          <p:cNvPr id="10" name="Picture 9">
-            <a:extLst>
-              <a:ext uri="{FF2B5EF4-FFF2-40B4-BE49-F238E27FC236}">
-                <a16:creationId xmlns:a16="http://schemas.microsoft.com/office/drawing/2014/main" id="{F1A9F831-83E7-478D-83A6-020919D65D5E}"/>
-              </a:ext>
-            </a:extLst>
-          </p:cNvPr>
-          <p:cNvPicPr>
-            <a:picLocks noChangeAspect="1"/>
-          </p:cNvPicPr>
-          <p:nvPr/>
-        </p:nvPicPr>
-        <p:blipFill>
-          <a:blip r:embed="rId4">
-            <a:extLst>
-              <a:ext uri="{28A0092B-C50C-407E-A947-70E740481C1C}">
-                <a14:useLocalDpi xmlns:a14="http://schemas.microsoft.com/office/drawing/2010/main" val="0"/>
-              </a:ext>
-            </a:extLst>
-          </a:blip>
-          <a:stretch>
-            <a:fillRect/>
-          </a:stretch>
-        </p:blipFill>
-        <p:spPr>
-          <a:xfrm>
-            <a:off x="6484833" y="2591511"/>
-            <a:ext cx="1213503" cy="1371600"/>
-          </a:xfrm>
-          <a:prstGeom prst="rect">
-            <a:avLst/>
-          </a:prstGeom>
-          <a:solidFill>
-            <a:srgbClr val="FFFFFF">
-              <a:shade val="85000"/>
-            </a:srgbClr>
-          </a:solidFill>
-          <a:ln w="88900" cap="sq">
-            <a:solidFill>
-              <a:srgbClr val="FFFFFF"/>
-            </a:solidFill>
-            <a:miter lim="800000"/>
-          </a:ln>
-          <a:effectLst>
-            <a:outerShdw blurRad="55000" dist="18000" dir="5400000" algn="tl" rotWithShape="0">
-              <a:srgbClr val="000000">
-                <a:alpha val="40000"/>
-              </a:srgbClr>
-            </a:outerShdw>
-          </a:effectLst>
-          <a:scene3d>
-            <a:camera prst="orthographicFront"/>
-            <a:lightRig rig="twoPt" dir="t">
-              <a:rot lat="0" lon="0" rev="7200000"/>
-            </a:lightRig>
-          </a:scene3d>
-          <a:sp3d>
-            <a:bevelT w="25400" h="19050"/>
-            <a:contourClr>
-              <a:srgbClr val="FFFFFF"/>
-            </a:contourClr>
-          </a:sp3d>
-        </p:spPr>
-      </p:pic>
-      <p:pic>
-        <p:nvPicPr>
-          <p:cNvPr id="12" name="Picture 11">
-            <a:extLst>
-              <a:ext uri="{FF2B5EF4-FFF2-40B4-BE49-F238E27FC236}">
-                <a16:creationId xmlns:a16="http://schemas.microsoft.com/office/drawing/2014/main" id="{ECB3A3FE-FCB2-4C52-B9DE-C2CE003BF5D8}"/>
-              </a:ext>
-            </a:extLst>
-          </p:cNvPr>
-          <p:cNvPicPr>
-            <a:picLocks noChangeAspect="1"/>
-          </p:cNvPicPr>
-          <p:nvPr/>
-        </p:nvPicPr>
-        <p:blipFill>
-          <a:blip r:embed="rId5">
             <a:extLst>
               <a:ext uri="{28A0092B-C50C-407E-A947-70E740481C1C}">
                 <a14:useLocalDpi xmlns:a14="http://schemas.microsoft.com/office/drawing/2010/main" val="0"/>
@@ -7961,10 +7788,10 @@
       </p:pic>
       <p:sp>
         <p:nvSpPr>
-          <p:cNvPr id="13" name="Rectangle 12">
+          <p:cNvPr id="14" name="Rectangle 13">
             <a:extLst>
               <a:ext uri="{FF2B5EF4-FFF2-40B4-BE49-F238E27FC236}">
-                <a16:creationId xmlns:a16="http://schemas.microsoft.com/office/drawing/2014/main" id="{6834D81B-32AB-465C-A353-5ED5014B2BD7}"/>
+                <a16:creationId xmlns:a16="http://schemas.microsoft.com/office/drawing/2014/main" xmlns="" id="{24EF997E-A4CF-499D-802B-D7CEF3A47FF1}"/>
               </a:ext>
             </a:extLst>
           </p:cNvPr>
@@ -7973,7 +7800,59 @@
         </p:nvSpPr>
         <p:spPr>
           <a:xfrm>
-            <a:off x="685082" y="4169723"/>
+            <a:off x="8706601" y="4175506"/>
+            <a:ext cx="2105637" cy="1027230"/>
+          </a:xfrm>
+          <a:prstGeom prst="rect">
+            <a:avLst/>
+          </a:prstGeom>
+          <a:solidFill>
+            <a:schemeClr val="tx2">
+              <a:lumMod val="40000"/>
+              <a:lumOff val="60000"/>
+            </a:schemeClr>
+          </a:solidFill>
+        </p:spPr>
+        <p:style>
+          <a:lnRef idx="2">
+            <a:schemeClr val="accent1">
+              <a:shade val="50000"/>
+            </a:schemeClr>
+          </a:lnRef>
+          <a:fillRef idx="1">
+            <a:schemeClr val="accent1"/>
+          </a:fillRef>
+          <a:effectRef idx="0">
+            <a:schemeClr val="accent1"/>
+          </a:effectRef>
+          <a:fontRef idx="minor">
+            <a:schemeClr val="lt1"/>
+          </a:fontRef>
+        </p:style>
+        <p:txBody>
+          <a:bodyPr rtlCol="0" anchor="ctr"/>
+          <a:lstStyle/>
+          <a:p>
+            <a:pPr algn="ctr"/>
+            <a:endParaRPr lang="en-US"/>
+          </a:p>
+        </p:txBody>
+      </p:sp>
+      <p:sp>
+        <p:nvSpPr>
+          <p:cNvPr id="15" name="Rectangle 14">
+            <a:extLst>
+              <a:ext uri="{FF2B5EF4-FFF2-40B4-BE49-F238E27FC236}">
+                <a16:creationId xmlns:a16="http://schemas.microsoft.com/office/drawing/2014/main" xmlns="" id="{5A76B9D8-070B-4521-BABA-04806EB797E5}"/>
+              </a:ext>
+            </a:extLst>
+          </p:cNvPr>
+          <p:cNvSpPr/>
+          <p:nvPr/>
+        </p:nvSpPr>
+        <p:spPr>
+          <a:xfrm>
+            <a:off x="4956689" y="4175506"/>
             <a:ext cx="2105637" cy="1027229"/>
           </a:xfrm>
           <a:prstGeom prst="rect">
@@ -8013,10 +7892,10 @@
       </p:sp>
       <p:sp>
         <p:nvSpPr>
-          <p:cNvPr id="14" name="Rectangle 13">
+          <p:cNvPr id="16" name="Rectangle 15">
             <a:extLst>
               <a:ext uri="{FF2B5EF4-FFF2-40B4-BE49-F238E27FC236}">
-                <a16:creationId xmlns:a16="http://schemas.microsoft.com/office/drawing/2014/main" id="{24EF997E-A4CF-499D-802B-D7CEF3A47FF1}"/>
+                <a16:creationId xmlns:a16="http://schemas.microsoft.com/office/drawing/2014/main" xmlns="" id="{45776360-FFF3-4710-8750-E273CF9EC642}"/>
               </a:ext>
             </a:extLst>
           </p:cNvPr>
@@ -8025,111 +7904,7 @@
         </p:nvSpPr>
         <p:spPr>
           <a:xfrm>
-            <a:off x="8715905" y="4169722"/>
-            <a:ext cx="2105637" cy="1027230"/>
-          </a:xfrm>
-          <a:prstGeom prst="rect">
-            <a:avLst/>
-          </a:prstGeom>
-          <a:solidFill>
-            <a:schemeClr val="tx2">
-              <a:lumMod val="40000"/>
-              <a:lumOff val="60000"/>
-            </a:schemeClr>
-          </a:solidFill>
-        </p:spPr>
-        <p:style>
-          <a:lnRef idx="2">
-            <a:schemeClr val="accent1">
-              <a:shade val="50000"/>
-            </a:schemeClr>
-          </a:lnRef>
-          <a:fillRef idx="1">
-            <a:schemeClr val="accent1"/>
-          </a:fillRef>
-          <a:effectRef idx="0">
-            <a:schemeClr val="accent1"/>
-          </a:effectRef>
-          <a:fontRef idx="minor">
-            <a:schemeClr val="lt1"/>
-          </a:fontRef>
-        </p:style>
-        <p:txBody>
-          <a:bodyPr rtlCol="0" anchor="ctr"/>
-          <a:lstStyle/>
-          <a:p>
-            <a:pPr algn="ctr"/>
-            <a:endParaRPr lang="en-US"/>
-          </a:p>
-        </p:txBody>
-      </p:sp>
-      <p:sp>
-        <p:nvSpPr>
-          <p:cNvPr id="15" name="Rectangle 14">
-            <a:extLst>
-              <a:ext uri="{FF2B5EF4-FFF2-40B4-BE49-F238E27FC236}">
-                <a16:creationId xmlns:a16="http://schemas.microsoft.com/office/drawing/2014/main" id="{5A76B9D8-070B-4521-BABA-04806EB797E5}"/>
-              </a:ext>
-            </a:extLst>
-          </p:cNvPr>
-          <p:cNvSpPr/>
-          <p:nvPr/>
-        </p:nvSpPr>
-        <p:spPr>
-          <a:xfrm>
-            <a:off x="6016485" y="4169722"/>
-            <a:ext cx="2105637" cy="1027229"/>
-          </a:xfrm>
-          <a:prstGeom prst="rect">
-            <a:avLst/>
-          </a:prstGeom>
-          <a:solidFill>
-            <a:schemeClr val="tx2">
-              <a:lumMod val="40000"/>
-              <a:lumOff val="60000"/>
-            </a:schemeClr>
-          </a:solidFill>
-        </p:spPr>
-        <p:style>
-          <a:lnRef idx="2">
-            <a:schemeClr val="accent1">
-              <a:shade val="50000"/>
-            </a:schemeClr>
-          </a:lnRef>
-          <a:fillRef idx="1">
-            <a:schemeClr val="accent1"/>
-          </a:fillRef>
-          <a:effectRef idx="0">
-            <a:schemeClr val="accent1"/>
-          </a:effectRef>
-          <a:fontRef idx="minor">
-            <a:schemeClr val="lt1"/>
-          </a:fontRef>
-        </p:style>
-        <p:txBody>
-          <a:bodyPr rtlCol="0" anchor="ctr"/>
-          <a:lstStyle/>
-          <a:p>
-            <a:pPr algn="ctr"/>
-            <a:endParaRPr lang="en-US"/>
-          </a:p>
-        </p:txBody>
-      </p:sp>
-      <p:sp>
-        <p:nvSpPr>
-          <p:cNvPr id="16" name="Rectangle 15">
-            <a:extLst>
-              <a:ext uri="{FF2B5EF4-FFF2-40B4-BE49-F238E27FC236}">
-                <a16:creationId xmlns:a16="http://schemas.microsoft.com/office/drawing/2014/main" id="{45776360-FFF3-4710-8750-E273CF9EC642}"/>
-              </a:ext>
-            </a:extLst>
-          </p:cNvPr>
-          <p:cNvSpPr/>
-          <p:nvPr/>
-        </p:nvSpPr>
-        <p:spPr>
-          <a:xfrm>
-            <a:off x="3317065" y="4181289"/>
+            <a:off x="1216079" y="4181289"/>
             <a:ext cx="2105637" cy="1015664"/>
           </a:xfrm>
           <a:prstGeom prst="rect">
@@ -8172,10 +7947,10 @@
       </p:sp>
       <p:sp>
         <p:nvSpPr>
-          <p:cNvPr id="17" name="TextBox 16">
+          <p:cNvPr id="18" name="TextBox 17">
             <a:extLst>
               <a:ext uri="{FF2B5EF4-FFF2-40B4-BE49-F238E27FC236}">
-                <a16:creationId xmlns:a16="http://schemas.microsoft.com/office/drawing/2014/main" id="{D0C58102-7C51-4C73-AA85-CDD6DA8D88EB}"/>
+                <a16:creationId xmlns:a16="http://schemas.microsoft.com/office/drawing/2014/main" xmlns="" id="{8C71716E-E7D6-4BD4-9CAF-058127C07444}"/>
               </a:ext>
             </a:extLst>
           </p:cNvPr>
@@ -8184,8 +7959,8 @@
         </p:nvSpPr>
         <p:spPr>
           <a:xfrm>
-            <a:off x="685081" y="4320725"/>
-            <a:ext cx="2105637" cy="984885"/>
+            <a:off x="1216079" y="4304399"/>
+            <a:ext cx="2105637" cy="707886"/>
           </a:xfrm>
           <a:prstGeom prst="rect">
             <a:avLst/>
@@ -8200,9 +7975,10 @@
           <a:p>
             <a:pPr algn="ctr"/>
             <a:r>
-              <a:rPr lang="en-US" sz="2000" dirty="0"/>
-              <a:t>NVBalandin22</a:t>
+              <a:rPr lang="en-GB" sz="2000" dirty="0" smtClean="0"/>
+              <a:t>NKYanakiev22</a:t>
             </a:r>
+            <a:endParaRPr lang="en-US" sz="2000" dirty="0" smtClean="0"/>
           </a:p>
           <a:p>
             <a:pPr algn="ctr"/>
@@ -8210,19 +7986,16 @@
               <a:rPr lang="en-US" sz="2000" dirty="0"/>
               <a:t>Developer</a:t>
             </a:r>
-            <a:br>
-              <a:rPr lang="en-US" dirty="0"/>
-            </a:br>
-            <a:endParaRPr lang="en-US" dirty="0"/>
+            <a:endParaRPr lang="en-US" sz="2000" dirty="0"/>
           </a:p>
         </p:txBody>
       </p:sp>
       <p:sp>
         <p:nvSpPr>
-          <p:cNvPr id="18" name="TextBox 17">
+          <p:cNvPr id="19" name="TextBox 18">
             <a:extLst>
               <a:ext uri="{FF2B5EF4-FFF2-40B4-BE49-F238E27FC236}">
-                <a16:creationId xmlns:a16="http://schemas.microsoft.com/office/drawing/2014/main" id="{8C71716E-E7D6-4BD4-9CAF-058127C07444}"/>
+                <a16:creationId xmlns:a16="http://schemas.microsoft.com/office/drawing/2014/main" xmlns="" id="{CE7D45AC-CD49-4193-9135-F0A872F827F0}"/>
               </a:ext>
             </a:extLst>
           </p:cNvPr>
@@ -8231,57 +8004,7 @@
         </p:nvSpPr>
         <p:spPr>
           <a:xfrm>
-            <a:off x="3321716" y="4181289"/>
-            <a:ext cx="2105637" cy="1015663"/>
-          </a:xfrm>
-          <a:prstGeom prst="rect">
-            <a:avLst/>
-          </a:prstGeom>
-          <a:noFill/>
-        </p:spPr>
-        <p:txBody>
-          <a:bodyPr wrap="square" rtlCol="0">
-            <a:spAutoFit/>
-          </a:bodyPr>
-          <a:lstStyle/>
-          <a:p>
-            <a:pPr algn="ctr"/>
-            <a:r>
-              <a:rPr lang="en-US" sz="2000" dirty="0"/>
-              <a:t>PSIvanov22</a:t>
-            </a:r>
-          </a:p>
-          <a:p>
-            <a:pPr algn="ctr"/>
-            <a:r>
-              <a:rPr lang="en-US" sz="2000" dirty="0"/>
-              <a:t>Scrum &amp;</a:t>
-            </a:r>
-          </a:p>
-          <a:p>
-            <a:pPr algn="ctr"/>
-            <a:r>
-              <a:rPr lang="en-US" sz="2000" dirty="0"/>
-              <a:t>Designer</a:t>
-            </a:r>
-          </a:p>
-        </p:txBody>
-      </p:sp>
-      <p:sp>
-        <p:nvSpPr>
-          <p:cNvPr id="19" name="TextBox 18">
-            <a:extLst>
-              <a:ext uri="{FF2B5EF4-FFF2-40B4-BE49-F238E27FC236}">
-                <a16:creationId xmlns:a16="http://schemas.microsoft.com/office/drawing/2014/main" id="{CE7D45AC-CD49-4193-9135-F0A872F827F0}"/>
-              </a:ext>
-            </a:extLst>
-          </p:cNvPr>
-          <p:cNvSpPr txBox="1"/>
-          <p:nvPr/>
-        </p:nvSpPr>
-        <p:spPr>
-          <a:xfrm>
-            <a:off x="6009508" y="4312045"/>
+            <a:off x="4956689" y="4365954"/>
             <a:ext cx="2110288" cy="646331"/>
           </a:xfrm>
           <a:prstGeom prst="rect">
@@ -8305,8 +8028,9 @@
             <a:pPr algn="ctr"/>
             <a:r>
               <a:rPr lang="en-US" dirty="0"/>
-              <a:t>Developer</a:t>
+              <a:t>Scrum</a:t>
             </a:r>
+            <a:endParaRPr lang="en-US" dirty="0"/>
           </a:p>
         </p:txBody>
       </p:sp>
@@ -8315,7 +8039,7 @@
           <p:cNvPr id="20" name="TextBox 19">
             <a:extLst>
               <a:ext uri="{FF2B5EF4-FFF2-40B4-BE49-F238E27FC236}">
-                <a16:creationId xmlns:a16="http://schemas.microsoft.com/office/drawing/2014/main" id="{19DFAF63-AC0E-41CD-B63C-3967EA780EF8}"/>
+                <a16:creationId xmlns:a16="http://schemas.microsoft.com/office/drawing/2014/main" xmlns="" id="{19DFAF63-AC0E-41CD-B63C-3967EA780EF8}"/>
               </a:ext>
             </a:extLst>
           </p:cNvPr>
@@ -8353,6 +8077,130 @@
           </a:p>
         </p:txBody>
       </p:sp>
+      <p:pic>
+        <p:nvPicPr>
+          <p:cNvPr id="5" name="Картина 4"/>
+          <p:cNvPicPr>
+            <a:picLocks noChangeAspect="1"/>
+          </p:cNvPicPr>
+          <p:nvPr/>
+        </p:nvPicPr>
+        <p:blipFill>
+          <a:blip r:embed="rId3" cstate="print">
+            <a:extLst>
+              <a:ext uri="{28A0092B-C50C-407E-A947-70E740481C1C}">
+                <a14:useLocalDpi xmlns:a14="http://schemas.microsoft.com/office/drawing/2010/main" val="0"/>
+              </a:ext>
+            </a:extLst>
+          </a:blip>
+          <a:stretch>
+            <a:fillRect/>
+          </a:stretch>
+        </p:blipFill>
+        <p:spPr>
+          <a:xfrm flipH="1">
+            <a:off x="1583097" y="2743200"/>
+            <a:ext cx="1371600" cy="1371600"/>
+          </a:xfrm>
+          <a:prstGeom prst="rect">
+            <a:avLst/>
+          </a:prstGeom>
+          <a:solidFill>
+            <a:srgbClr val="FFFFFF">
+              <a:shade val="85000"/>
+            </a:srgbClr>
+          </a:solidFill>
+          <a:ln w="88900" cap="sq">
+            <a:solidFill>
+              <a:srgbClr val="FFFFFF"/>
+            </a:solidFill>
+            <a:miter lim="800000"/>
+          </a:ln>
+          <a:effectLst>
+            <a:outerShdw blurRad="55000" dist="18000" dir="5400000" algn="tl" rotWithShape="0">
+              <a:srgbClr val="000000">
+                <a:alpha val="40000"/>
+              </a:srgbClr>
+            </a:outerShdw>
+          </a:effectLst>
+          <a:scene3d>
+            <a:camera prst="orthographicFront"/>
+            <a:lightRig rig="twoPt" dir="t">
+              <a:rot lat="0" lon="0" rev="7200000"/>
+            </a:lightRig>
+          </a:scene3d>
+          <a:sp3d>
+            <a:bevelT w="25400" h="19050"/>
+            <a:contourClr>
+              <a:srgbClr val="FFFFFF"/>
+            </a:contourClr>
+          </a:sp3d>
+        </p:spPr>
+      </p:pic>
+      <p:pic>
+        <p:nvPicPr>
+          <p:cNvPr id="1026" name="Picture 2"/>
+          <p:cNvPicPr>
+            <a:picLocks noChangeAspect="1" noChangeArrowheads="1"/>
+          </p:cNvPicPr>
+          <p:nvPr/>
+        </p:nvPicPr>
+        <p:blipFill>
+          <a:blip r:embed="rId4">
+            <a:extLst>
+              <a:ext uri="{28A0092B-C50C-407E-A947-70E740481C1C}">
+                <a14:useLocalDpi xmlns:a14="http://schemas.microsoft.com/office/drawing/2010/main" val="0"/>
+              </a:ext>
+            </a:extLst>
+          </a:blip>
+          <a:srcRect/>
+          <a:stretch>
+            <a:fillRect/>
+          </a:stretch>
+        </p:blipFill>
+        <p:spPr bwMode="auto">
+          <a:xfrm>
+            <a:off x="5372100" y="2627313"/>
+            <a:ext cx="1444625" cy="1603375"/>
+          </a:xfrm>
+          <a:prstGeom prst="rect">
+            <a:avLst/>
+          </a:prstGeom>
+          <a:noFill/>
+          <a:ln>
+            <a:noFill/>
+          </a:ln>
+          <a:effectLst/>
+          <a:extLst>
+            <a:ext uri="{909E8E84-426E-40DD-AFC4-6F175D3DCCD1}">
+              <a14:hiddenFill xmlns:a14="http://schemas.microsoft.com/office/drawing/2010/main">
+                <a:solidFill>
+                  <a:schemeClr val="accent1"/>
+                </a:solidFill>
+              </a14:hiddenFill>
+            </a:ext>
+            <a:ext uri="{91240B29-F687-4F45-9708-019B960494DF}">
+              <a14:hiddenLine xmlns:a14="http://schemas.microsoft.com/office/drawing/2010/main" w="9525">
+                <a:solidFill>
+                  <a:schemeClr val="tx1"/>
+                </a:solidFill>
+                <a:miter lim="800000"/>
+                <a:headEnd/>
+                <a:tailEnd/>
+              </a14:hiddenLine>
+            </a:ext>
+            <a:ext uri="{AF507438-7753-43E0-B8FC-AC1667EBCBE1}">
+              <a14:hiddenEffects xmlns:a14="http://schemas.microsoft.com/office/drawing/2010/main">
+                <a:effectLst>
+                  <a:outerShdw dist="35921" dir="2700000" algn="ctr" rotWithShape="0">
+                    <a:schemeClr val="bg2"/>
+                  </a:outerShdw>
+                </a:effectLst>
+              </a14:hiddenEffects>
+            </a:ext>
+          </a:extLst>
+        </p:spPr>
+      </p:pic>
     </p:spTree>
     <p:extLst>
       <p:ext uri="{BB962C8B-B14F-4D97-AF65-F5344CB8AC3E}">
@@ -8388,7 +8236,7 @@
           <p:cNvPr id="7" name="Rectangle: Top Corners Rounded 6">
             <a:extLst>
               <a:ext uri="{FF2B5EF4-FFF2-40B4-BE49-F238E27FC236}">
-                <a16:creationId xmlns:a16="http://schemas.microsoft.com/office/drawing/2014/main" id="{40AC7EF1-7A73-4A2F-AD39-300B5A19B438}"/>
+                <a16:creationId xmlns:a16="http://schemas.microsoft.com/office/drawing/2014/main" xmlns="" id="{40AC7EF1-7A73-4A2F-AD39-300B5A19B438}"/>
               </a:ext>
             </a:extLst>
           </p:cNvPr>
@@ -8440,7 +8288,7 @@
           <p:cNvPr id="6" name="Rectangle: Top Corners Rounded 5">
             <a:extLst>
               <a:ext uri="{FF2B5EF4-FFF2-40B4-BE49-F238E27FC236}">
-                <a16:creationId xmlns:a16="http://schemas.microsoft.com/office/drawing/2014/main" id="{82FD5AC1-137A-4ECE-A9EE-736A0FE50CCD}"/>
+                <a16:creationId xmlns:a16="http://schemas.microsoft.com/office/drawing/2014/main" xmlns="" id="{82FD5AC1-137A-4ECE-A9EE-736A0FE50CCD}"/>
               </a:ext>
             </a:extLst>
           </p:cNvPr>
@@ -8492,7 +8340,7 @@
           <p:cNvPr id="4" name="Rectangle: Top Corners Rounded 3">
             <a:extLst>
               <a:ext uri="{FF2B5EF4-FFF2-40B4-BE49-F238E27FC236}">
-                <a16:creationId xmlns:a16="http://schemas.microsoft.com/office/drawing/2014/main" id="{4A36ED98-E88A-4641-A82E-6CD914A921C5}"/>
+                <a16:creationId xmlns:a16="http://schemas.microsoft.com/office/drawing/2014/main" xmlns="" id="{4A36ED98-E88A-4641-A82E-6CD914A921C5}"/>
               </a:ext>
             </a:extLst>
           </p:cNvPr>
@@ -8544,7 +8392,7 @@
           <p:cNvPr id="2" name="Title 1">
             <a:extLst>
               <a:ext uri="{FF2B5EF4-FFF2-40B4-BE49-F238E27FC236}">
-                <a16:creationId xmlns:a16="http://schemas.microsoft.com/office/drawing/2014/main" id="{7A4919D0-F177-4BBA-9A0B-DBA69E2ED764}"/>
+                <a16:creationId xmlns:a16="http://schemas.microsoft.com/office/drawing/2014/main" xmlns="" id="{7A4919D0-F177-4BBA-9A0B-DBA69E2ED764}"/>
               </a:ext>
             </a:extLst>
           </p:cNvPr>
@@ -8580,7 +8428,7 @@
           <p:cNvPr id="5" name="Content Placeholder 2">
             <a:extLst>
               <a:ext uri="{FF2B5EF4-FFF2-40B4-BE49-F238E27FC236}">
-                <a16:creationId xmlns:a16="http://schemas.microsoft.com/office/drawing/2014/main" id="{91DB1382-7276-49FA-9632-38D558F457E3}"/>
+                <a16:creationId xmlns:a16="http://schemas.microsoft.com/office/drawing/2014/main" xmlns="" id="{91DB1382-7276-49FA-9632-38D558F457E3}"/>
               </a:ext>
             </a:extLst>
           </p:cNvPr>
@@ -8591,7 +8439,7 @@
             <p:ph idx="1"/>
             <p:extLst>
               <p:ext uri="{D42A27DB-BD31-4B8C-83A1-F6EECF244321}">
-                <p14:modId xmlns:p14="http://schemas.microsoft.com/office/powerpoint/2010/main" val="3958465286"/>
+                <p14:modId xmlns:p14="http://schemas.microsoft.com/office/powerpoint/2010/main" val="169495847"/>
               </p:ext>
             </p:extLst>
           </p:nvPr>
@@ -8641,7 +8489,7 @@
           <p:cNvPr id="2" name="Title 1">
             <a:extLst>
               <a:ext uri="{FF2B5EF4-FFF2-40B4-BE49-F238E27FC236}">
-                <a16:creationId xmlns:a16="http://schemas.microsoft.com/office/drawing/2014/main" id="{47F4C865-2FA4-4233-9341-7FF05438FBAC}"/>
+                <a16:creationId xmlns:a16="http://schemas.microsoft.com/office/drawing/2014/main" xmlns="" id="{47F4C865-2FA4-4233-9341-7FF05438FBAC}"/>
               </a:ext>
             </a:extLst>
           </p:cNvPr>
@@ -8675,7 +8523,7 @@
           <p:cNvPr id="4" name="Picture 3">
             <a:extLst>
               <a:ext uri="{FF2B5EF4-FFF2-40B4-BE49-F238E27FC236}">
-                <a16:creationId xmlns:a16="http://schemas.microsoft.com/office/drawing/2014/main" id="{4A457C1B-F184-4809-A122-E7E3D56FD7FA}"/>
+                <a16:creationId xmlns:a16="http://schemas.microsoft.com/office/drawing/2014/main" xmlns="" id="{4A457C1B-F184-4809-A122-E7E3D56FD7FA}"/>
               </a:ext>
             </a:extLst>
           </p:cNvPr>
@@ -8705,7 +8553,7 @@
           <p:cNvPr id="1030" name="Picture 6" descr="Microsoft Teams icon PNG and SVG Vector Free Download">
             <a:extLst>
               <a:ext uri="{FF2B5EF4-FFF2-40B4-BE49-F238E27FC236}">
-                <a16:creationId xmlns:a16="http://schemas.microsoft.com/office/drawing/2014/main" id="{E63CB520-8362-480D-8932-BCA759F52162}"/>
+                <a16:creationId xmlns:a16="http://schemas.microsoft.com/office/drawing/2014/main" xmlns="" id="{E63CB520-8362-480D-8932-BCA759F52162}"/>
               </a:ext>
             </a:extLst>
           </p:cNvPr>
@@ -8752,7 +8600,7 @@
           <p:cNvPr id="1032" name="Picture 8" descr="Github Logo - Free social media icons">
             <a:extLst>
               <a:ext uri="{FF2B5EF4-FFF2-40B4-BE49-F238E27FC236}">
-                <a16:creationId xmlns:a16="http://schemas.microsoft.com/office/drawing/2014/main" id="{7A3CA418-3717-431C-9EA9-47665DCAFD01}"/>
+                <a16:creationId xmlns:a16="http://schemas.microsoft.com/office/drawing/2014/main" xmlns="" id="{7A3CA418-3717-431C-9EA9-47665DCAFD01}"/>
               </a:ext>
             </a:extLst>
           </p:cNvPr>
@@ -8799,7 +8647,7 @@
           <p:cNvPr id="1034" name="Picture 10" descr="File:Microsoft Office PowerPoint (2019–present).svg - Wikimedia Commons">
             <a:extLst>
               <a:ext uri="{FF2B5EF4-FFF2-40B4-BE49-F238E27FC236}">
-                <a16:creationId xmlns:a16="http://schemas.microsoft.com/office/drawing/2014/main" id="{51089B8F-91E8-4CF1-9ABB-70F19974983C}"/>
+                <a16:creationId xmlns:a16="http://schemas.microsoft.com/office/drawing/2014/main" xmlns="" id="{51089B8F-91E8-4CF1-9ABB-70F19974983C}"/>
               </a:ext>
             </a:extLst>
           </p:cNvPr>
@@ -8876,7 +8724,7 @@
           <p:cNvPr id="4" name="Rectangle: Rounded Corners 3">
             <a:extLst>
               <a:ext uri="{FF2B5EF4-FFF2-40B4-BE49-F238E27FC236}">
-                <a16:creationId xmlns:a16="http://schemas.microsoft.com/office/drawing/2014/main" id="{B8484A68-F6DA-400B-B919-D6506AAACBE6}"/>
+                <a16:creationId xmlns:a16="http://schemas.microsoft.com/office/drawing/2014/main" xmlns="" id="{B8484A68-F6DA-400B-B919-D6506AAACBE6}"/>
               </a:ext>
             </a:extLst>
           </p:cNvPr>
@@ -8922,7 +8770,7 @@
           <p:cNvPr id="2" name="Title 1">
             <a:extLst>
               <a:ext uri="{FF2B5EF4-FFF2-40B4-BE49-F238E27FC236}">
-                <a16:creationId xmlns:a16="http://schemas.microsoft.com/office/drawing/2014/main" id="{14542756-E282-498B-A67B-24137B46E707}"/>
+                <a16:creationId xmlns:a16="http://schemas.microsoft.com/office/drawing/2014/main" xmlns="" id="{14542756-E282-498B-A67B-24137B46E707}"/>
               </a:ext>
             </a:extLst>
           </p:cNvPr>
@@ -9233,7 +9081,7 @@
   <a:extraClrSchemeLst/>
   <a:extLst>
     <a:ext uri="{05A4C25C-085E-4340-85A3-A5531E510DB2}">
-      <thm15:themeFamily xmlns:thm15="http://schemas.microsoft.com/office/thememl/2012/main" name="FIVE.pptx" id="{928531FE-40B6-4895-993A-83D26AA1E005}" vid="{C99C5ABD-1620-4AD2-A38C-62625556F38B}"/>
+      <thm15:themeFamily xmlns:thm15="http://schemas.microsoft.com/office/thememl/2012/main" xmlns="" name="FIVE.pptx" id="{928531FE-40B6-4895-993A-83D26AA1E005}" vid="{C99C5ABD-1620-4AD2-A38C-62625556F38B}"/>
     </a:ext>
   </a:extLst>
 </a:theme>

</xml_diff>